<commit_message>
Bolster discussion in 'Streamflow Routing Package Cross-SectionTable Input File' section as discussed.
</commit_message>
<xml_diff>
--- a/doc/mf6io/Figures/n-point-cross-section.pptx
+++ b/doc/mf6io/Figures/n-point-cross-section.pptx
@@ -104,6 +104,11 @@
       </a:defRPr>
     </a:lvl9pPr>
   </p:defaultTextStyle>
+  <p:extLst>
+    <p:ext uri="{EFAFB233-063F-42B5-8137-9DF3F51BA10A}">
+      <p15:sldGuideLst xmlns:p15="http://schemas.microsoft.com/office/powerpoint/2012/main"/>
+    </p:ext>
+  </p:extLst>
 </p:presentation>
 </file>
 
@@ -238,7 +243,7 @@
           <a:p>
             <a:fld id="{08B1C415-82D3-3042-8F01-9D8E178489A3}" type="datetimeFigureOut">
               <a:rPr lang="en-US" smtClean="0"/>
-              <a:t>11/5/21</a:t>
+              <a:t>5/2/2023</a:t>
             </a:fld>
             <a:endParaRPr lang="en-US"/>
           </a:p>
@@ -408,7 +413,7 @@
           <a:p>
             <a:fld id="{08B1C415-82D3-3042-8F01-9D8E178489A3}" type="datetimeFigureOut">
               <a:rPr lang="en-US" smtClean="0"/>
-              <a:t>11/5/21</a:t>
+              <a:t>5/2/2023</a:t>
             </a:fld>
             <a:endParaRPr lang="en-US"/>
           </a:p>
@@ -588,7 +593,7 @@
           <a:p>
             <a:fld id="{08B1C415-82D3-3042-8F01-9D8E178489A3}" type="datetimeFigureOut">
               <a:rPr lang="en-US" smtClean="0"/>
-              <a:t>11/5/21</a:t>
+              <a:t>5/2/2023</a:t>
             </a:fld>
             <a:endParaRPr lang="en-US"/>
           </a:p>
@@ -758,7 +763,7 @@
           <a:p>
             <a:fld id="{08B1C415-82D3-3042-8F01-9D8E178489A3}" type="datetimeFigureOut">
               <a:rPr lang="en-US" smtClean="0"/>
-              <a:t>11/5/21</a:t>
+              <a:t>5/2/2023</a:t>
             </a:fld>
             <a:endParaRPr lang="en-US"/>
           </a:p>
@@ -1004,7 +1009,7 @@
           <a:p>
             <a:fld id="{08B1C415-82D3-3042-8F01-9D8E178489A3}" type="datetimeFigureOut">
               <a:rPr lang="en-US" smtClean="0"/>
-              <a:t>11/5/21</a:t>
+              <a:t>5/2/2023</a:t>
             </a:fld>
             <a:endParaRPr lang="en-US"/>
           </a:p>
@@ -1236,7 +1241,7 @@
           <a:p>
             <a:fld id="{08B1C415-82D3-3042-8F01-9D8E178489A3}" type="datetimeFigureOut">
               <a:rPr lang="en-US" smtClean="0"/>
-              <a:t>11/5/21</a:t>
+              <a:t>5/2/2023</a:t>
             </a:fld>
             <a:endParaRPr lang="en-US"/>
           </a:p>
@@ -1603,7 +1608,7 @@
           <a:p>
             <a:fld id="{08B1C415-82D3-3042-8F01-9D8E178489A3}" type="datetimeFigureOut">
               <a:rPr lang="en-US" smtClean="0"/>
-              <a:t>11/5/21</a:t>
+              <a:t>5/2/2023</a:t>
             </a:fld>
             <a:endParaRPr lang="en-US"/>
           </a:p>
@@ -1721,7 +1726,7 @@
           <a:p>
             <a:fld id="{08B1C415-82D3-3042-8F01-9D8E178489A3}" type="datetimeFigureOut">
               <a:rPr lang="en-US" smtClean="0"/>
-              <a:t>11/5/21</a:t>
+              <a:t>5/2/2023</a:t>
             </a:fld>
             <a:endParaRPr lang="en-US"/>
           </a:p>
@@ -1816,7 +1821,7 @@
           <a:p>
             <a:fld id="{08B1C415-82D3-3042-8F01-9D8E178489A3}" type="datetimeFigureOut">
               <a:rPr lang="en-US" smtClean="0"/>
-              <a:t>11/5/21</a:t>
+              <a:t>5/2/2023</a:t>
             </a:fld>
             <a:endParaRPr lang="en-US"/>
           </a:p>
@@ -2093,7 +2098,7 @@
           <a:p>
             <a:fld id="{08B1C415-82D3-3042-8F01-9D8E178489A3}" type="datetimeFigureOut">
               <a:rPr lang="en-US" smtClean="0"/>
-              <a:t>11/5/21</a:t>
+              <a:t>5/2/2023</a:t>
             </a:fld>
             <a:endParaRPr lang="en-US"/>
           </a:p>
@@ -2350,7 +2355,7 @@
           <a:p>
             <a:fld id="{08B1C415-82D3-3042-8F01-9D8E178489A3}" type="datetimeFigureOut">
               <a:rPr lang="en-US" smtClean="0"/>
-              <a:t>11/5/21</a:t>
+              <a:t>5/2/2023</a:t>
             </a:fld>
             <a:endParaRPr lang="en-US"/>
           </a:p>
@@ -2563,7 +2568,7 @@
           <a:p>
             <a:fld id="{08B1C415-82D3-3042-8F01-9D8E178489A3}" type="datetimeFigureOut">
               <a:rPr lang="en-US" smtClean="0"/>
-              <a:t>11/5/21</a:t>
+              <a:t>5/2/2023</a:t>
             </a:fld>
             <a:endParaRPr lang="en-US"/>
           </a:p>
@@ -2990,49 +2995,6 @@
         </p:grpSpPr>
         <p:cxnSp>
           <p:nvCxnSpPr>
-            <p:cNvPr id="55" name="Straight Connector 54">
-              <a:extLst>
-                <a:ext uri="{FF2B5EF4-FFF2-40B4-BE49-F238E27FC236}">
-                  <a16:creationId xmlns:a16="http://schemas.microsoft.com/office/drawing/2014/main" id="{59D44541-FC9C-2C45-9696-1427AA9A2815}"/>
-                </a:ext>
-              </a:extLst>
-            </p:cNvPr>
-            <p:cNvCxnSpPr>
-              <a:cxnSpLocks/>
-            </p:cNvCxnSpPr>
-            <p:nvPr/>
-          </p:nvCxnSpPr>
-          <p:spPr>
-            <a:xfrm flipV="1">
-              <a:off x="4110719" y="530792"/>
-              <a:ext cx="0" cy="318277"/>
-            </a:xfrm>
-            <a:prstGeom prst="line">
-              <a:avLst/>
-            </a:prstGeom>
-            <a:ln>
-              <a:solidFill>
-                <a:schemeClr val="tx1"/>
-              </a:solidFill>
-            </a:ln>
-          </p:spPr>
-          <p:style>
-            <a:lnRef idx="1">
-              <a:schemeClr val="accent1"/>
-            </a:lnRef>
-            <a:fillRef idx="0">
-              <a:schemeClr val="accent1"/>
-            </a:fillRef>
-            <a:effectRef idx="0">
-              <a:schemeClr val="accent1"/>
-            </a:effectRef>
-            <a:fontRef idx="minor">
-              <a:schemeClr val="tx1"/>
-            </a:fontRef>
-          </p:style>
-        </p:cxnSp>
-        <p:cxnSp>
-          <p:nvCxnSpPr>
             <p:cNvPr id="52" name="Straight Connector 51">
               <a:extLst>
                 <a:ext uri="{FF2B5EF4-FFF2-40B4-BE49-F238E27FC236}">
@@ -3047,7 +3009,7 @@
           </p:nvCxnSpPr>
           <p:spPr>
             <a:xfrm flipV="1">
-              <a:off x="834959" y="530792"/>
+              <a:off x="847901" y="530792"/>
               <a:ext cx="0" cy="318277"/>
             </a:xfrm>
             <a:prstGeom prst="line">
@@ -3134,6 +3096,26 @@
                 <a:gd name="connsiteY8" fmla="*/ 475989 h 2505205"/>
                 <a:gd name="connsiteX9" fmla="*/ 6475956 w 6475956"/>
                 <a:gd name="connsiteY9" fmla="*/ 0 h 2505205"/>
+                <a:gd name="connsiteX0" fmla="*/ 0 w 6475956"/>
+                <a:gd name="connsiteY0" fmla="*/ 162838 h 2505205"/>
+                <a:gd name="connsiteX1" fmla="*/ 701457 w 6475956"/>
+                <a:gd name="connsiteY1" fmla="*/ 1089764 h 2505205"/>
+                <a:gd name="connsiteX2" fmla="*/ 1515649 w 6475956"/>
+                <a:gd name="connsiteY2" fmla="*/ 951978 h 2505205"/>
+                <a:gd name="connsiteX3" fmla="*/ 2066794 w 6475956"/>
+                <a:gd name="connsiteY3" fmla="*/ 1791222 h 2505205"/>
+                <a:gd name="connsiteX4" fmla="*/ 3244241 w 6475956"/>
+                <a:gd name="connsiteY4" fmla="*/ 2505205 h 2505205"/>
+                <a:gd name="connsiteX5" fmla="*/ 4584526 w 6475956"/>
+                <a:gd name="connsiteY5" fmla="*/ 2279737 h 2505205"/>
+                <a:gd name="connsiteX6" fmla="*/ 4960307 w 6475956"/>
+                <a:gd name="connsiteY6" fmla="*/ 1691014 h 2505205"/>
+                <a:gd name="connsiteX7" fmla="*/ 5448822 w 6475956"/>
+                <a:gd name="connsiteY7" fmla="*/ 1139868 h 2505205"/>
+                <a:gd name="connsiteX8" fmla="*/ 5827771 w 6475956"/>
+                <a:gd name="connsiteY8" fmla="*/ 437481 h 2505205"/>
+                <a:gd name="connsiteX9" fmla="*/ 6475956 w 6475956"/>
+                <a:gd name="connsiteY9" fmla="*/ 0 h 2505205"/>
               </a:gdLst>
               <a:ahLst/>
               <a:cxnLst>
@@ -3196,11 +3178,13 @@
                     <a:pt x="5448822" y="1139868"/>
                   </a:lnTo>
                   <a:lnTo>
-                    <a:pt x="5649238" y="475989"/>
+                    <a:pt x="5827771" y="437481"/>
                   </a:lnTo>
-                  <a:lnTo>
+                  <a:cubicBezTo>
+                    <a:pt x="6103344" y="278818"/>
+                    <a:pt x="6200383" y="158663"/>
                     <a:pt x="6475956" y="0"/>
-                  </a:lnTo>
+                  </a:cubicBezTo>
                 </a:path>
               </a:pathLst>
             </a:custGeom>
@@ -3250,8 +3234,8 @@
           </p:nvSpPr>
           <p:spPr>
             <a:xfrm>
-              <a:off x="835971" y="853456"/>
-              <a:ext cx="3279628" cy="1188383"/>
+              <a:off x="835971" y="888910"/>
+              <a:ext cx="3331387" cy="1152929"/>
             </a:xfrm>
             <a:custGeom>
               <a:avLst/>
@@ -3336,6 +3320,26 @@
                 <a:gd name="connsiteY8" fmla="*/ 526093 h 1929008"/>
                 <a:gd name="connsiteX9" fmla="*/ 0 w 5323561"/>
                 <a:gd name="connsiteY9" fmla="*/ 12526 h 1929008"/>
+                <a:gd name="connsiteX0" fmla="*/ 0 w 5407577"/>
+                <a:gd name="connsiteY0" fmla="*/ 1 h 1916483"/>
+                <a:gd name="connsiteX1" fmla="*/ 5407577 w 5407577"/>
+                <a:gd name="connsiteY1" fmla="*/ 1814 h 1916483"/>
+                <a:gd name="connsiteX2" fmla="*/ 5135671 w 5407577"/>
+                <a:gd name="connsiteY2" fmla="*/ 563673 h 1916483"/>
+                <a:gd name="connsiteX3" fmla="*/ 4634630 w 5407577"/>
+                <a:gd name="connsiteY3" fmla="*/ 1114818 h 1916483"/>
+                <a:gd name="connsiteX4" fmla="*/ 4271375 w 5407577"/>
+                <a:gd name="connsiteY4" fmla="*/ 1691015 h 1916483"/>
+                <a:gd name="connsiteX5" fmla="*/ 2931090 w 5407577"/>
+                <a:gd name="connsiteY5" fmla="*/ 1916483 h 1916483"/>
+                <a:gd name="connsiteX6" fmla="*/ 1741117 w 5407577"/>
+                <a:gd name="connsiteY6" fmla="*/ 1177448 h 1916483"/>
+                <a:gd name="connsiteX7" fmla="*/ 1215024 w 5407577"/>
+                <a:gd name="connsiteY7" fmla="*/ 363256 h 1916483"/>
+                <a:gd name="connsiteX8" fmla="*/ 388306 w 5407577"/>
+                <a:gd name="connsiteY8" fmla="*/ 513568 h 1916483"/>
+                <a:gd name="connsiteX9" fmla="*/ 0 w 5407577"/>
+                <a:gd name="connsiteY9" fmla="*/ 1 h 1916483"/>
               </a:gdLst>
               <a:ahLst/>
               <a:cxnLst>
@@ -3372,36 +3376,36 @@
               </a:cxnLst>
               <a:rect l="l" t="t" r="r" b="b"/>
               <a:pathLst>
-                <a:path w="5323561" h="1929008">
+                <a:path w="5407577" h="1916483">
                   <a:moveTo>
-                    <a:pt x="0" y="12526"/>
+                    <a:pt x="0" y="1"/>
                   </a:moveTo>
                   <a:lnTo>
-                    <a:pt x="5323561" y="0"/>
+                    <a:pt x="5407577" y="1814"/>
                   </a:lnTo>
                   <a:lnTo>
-                    <a:pt x="5135671" y="576198"/>
+                    <a:pt x="5135671" y="563673"/>
                   </a:lnTo>
                   <a:lnTo>
-                    <a:pt x="4634630" y="1127343"/>
+                    <a:pt x="4634630" y="1114818"/>
                   </a:lnTo>
                   <a:lnTo>
-                    <a:pt x="4271375" y="1703540"/>
+                    <a:pt x="4271375" y="1691015"/>
                   </a:lnTo>
                   <a:lnTo>
-                    <a:pt x="2931090" y="1929008"/>
+                    <a:pt x="2931090" y="1916483"/>
                   </a:lnTo>
                   <a:lnTo>
-                    <a:pt x="1741117" y="1189973"/>
+                    <a:pt x="1741117" y="1177448"/>
                   </a:lnTo>
                   <a:lnTo>
-                    <a:pt x="1215024" y="375781"/>
+                    <a:pt x="1215024" y="363256"/>
                   </a:lnTo>
                   <a:lnTo>
-                    <a:pt x="388306" y="526093"/>
+                    <a:pt x="388306" y="513568"/>
                   </a:lnTo>
                   <a:lnTo>
-                    <a:pt x="0" y="12526"/>
+                    <a:pt x="0" y="1"/>
                   </a:lnTo>
                   <a:close/>
                 </a:path>
@@ -3437,7 +3441,7 @@
             <a:lstStyle/>
             <a:p>
               <a:pPr algn="ctr"/>
-              <a:endParaRPr lang="en-US" sz="1080"/>
+              <a:endParaRPr lang="en-US" sz="1080" dirty="0"/>
             </a:p>
           </p:txBody>
         </p:sp>
@@ -3455,8 +3459,8 @@
           </p:nvSpPr>
           <p:spPr>
             <a:xfrm>
-              <a:off x="834959" y="858129"/>
-              <a:ext cx="3275760" cy="1183711"/>
+              <a:off x="834959" y="883371"/>
+              <a:ext cx="3327518" cy="1158470"/>
             </a:xfrm>
             <a:custGeom>
               <a:avLst/>
@@ -3551,6 +3555,24 @@
                 <a:gd name="connsiteY7" fmla="*/ 568615 h 1921425"/>
                 <a:gd name="connsiteX8" fmla="*/ 5317279 w 5317279"/>
                 <a:gd name="connsiteY8" fmla="*/ 0 h 1921425"/>
+                <a:gd name="connsiteX0" fmla="*/ 0 w 5401294"/>
+                <a:gd name="connsiteY0" fmla="*/ 0 h 1918122"/>
+                <a:gd name="connsiteX1" fmla="*/ 414999 w 5401294"/>
+                <a:gd name="connsiteY1" fmla="*/ 515207 h 1918122"/>
+                <a:gd name="connsiteX2" fmla="*/ 1204138 w 5401294"/>
+                <a:gd name="connsiteY2" fmla="*/ 377421 h 1918122"/>
+                <a:gd name="connsiteX3" fmla="*/ 1730231 w 5401294"/>
+                <a:gd name="connsiteY3" fmla="*/ 1204139 h 1918122"/>
+                <a:gd name="connsiteX4" fmla="*/ 2932730 w 5401294"/>
+                <a:gd name="connsiteY4" fmla="*/ 1918122 h 1918122"/>
+                <a:gd name="connsiteX5" fmla="*/ 4267734 w 5401294"/>
+                <a:gd name="connsiteY5" fmla="*/ 1682768 h 1918122"/>
+                <a:gd name="connsiteX6" fmla="*/ 4648796 w 5401294"/>
+                <a:gd name="connsiteY6" fmla="*/ 1103931 h 1918122"/>
+                <a:gd name="connsiteX7" fmla="*/ 5137311 w 5401294"/>
+                <a:gd name="connsiteY7" fmla="*/ 565312 h 1918122"/>
+                <a:gd name="connsiteX8" fmla="*/ 5401294 w 5401294"/>
+                <a:gd name="connsiteY8" fmla="*/ 18122 h 1918122"/>
               </a:gdLst>
               <a:ahLst/>
               <a:cxnLst>
@@ -3584,41 +3606,41 @@
               </a:cxnLst>
               <a:rect l="l" t="t" r="r" b="b"/>
               <a:pathLst>
-                <a:path w="5317279" h="1921425">
+                <a:path w="5401294" h="1918122">
                   <a:moveTo>
-                    <a:pt x="0" y="3303"/>
+                    <a:pt x="0" y="0"/>
                   </a:moveTo>
                   <a:lnTo>
-                    <a:pt x="414999" y="518510"/>
+                    <a:pt x="414999" y="515207"/>
                   </a:lnTo>
                   <a:lnTo>
-                    <a:pt x="1204138" y="380724"/>
+                    <a:pt x="1204138" y="377421"/>
                   </a:lnTo>
                   <a:lnTo>
-                    <a:pt x="1730231" y="1207442"/>
+                    <a:pt x="1730231" y="1204139"/>
                   </a:lnTo>
                   <a:lnTo>
-                    <a:pt x="2932730" y="1921425"/>
+                    <a:pt x="2932730" y="1918122"/>
                   </a:lnTo>
                   <a:lnTo>
-                    <a:pt x="4267734" y="1686071"/>
+                    <a:pt x="4267734" y="1682768"/>
                   </a:lnTo>
                   <a:lnTo>
-                    <a:pt x="4648796" y="1107234"/>
+                    <a:pt x="4648796" y="1103931"/>
                   </a:lnTo>
                   <a:lnTo>
-                    <a:pt x="5137311" y="568615"/>
+                    <a:pt x="5137311" y="565312"/>
                   </a:lnTo>
                   <a:cubicBezTo>
-                    <a:pt x="5187415" y="380724"/>
-                    <a:pt x="5267175" y="187891"/>
-                    <a:pt x="5317279" y="0"/>
+                    <a:pt x="5187415" y="377421"/>
+                    <a:pt x="5351190" y="206013"/>
+                    <a:pt x="5401294" y="18122"/>
                   </a:cubicBezTo>
                 </a:path>
               </a:pathLst>
             </a:custGeom>
             <a:noFill/>
-            <a:ln w="50800" cap="rnd">
+            <a:ln w="50800" cap="flat">
               <a:solidFill>
                 <a:srgbClr val="FFC000"/>
               </a:solidFill>
@@ -4319,7 +4341,7 @@
           </p:nvSpPr>
           <p:spPr>
             <a:xfrm rot="16200000">
-              <a:off x="4433756" y="1087701"/>
+              <a:off x="4433757" y="1087701"/>
               <a:ext cx="678553" cy="215444"/>
             </a:xfrm>
             <a:prstGeom prst="rect">
@@ -4395,8 +4417,8 @@
           </p:nvSpPr>
           <p:spPr>
             <a:xfrm>
-              <a:off x="3785446" y="1713610"/>
-              <a:ext cx="959455" cy="200055"/>
+              <a:off x="3806258" y="1709656"/>
+              <a:ext cx="803531" cy="200055"/>
             </a:xfrm>
             <a:prstGeom prst="rect">
               <a:avLst/>
@@ -4477,8 +4499,8 @@
           </p:nvSpPr>
           <p:spPr>
             <a:xfrm>
-              <a:off x="2206783" y="241996"/>
-              <a:ext cx="746584" cy="297004"/>
+              <a:off x="2267175" y="241996"/>
+              <a:ext cx="767175" cy="307777"/>
             </a:xfrm>
             <a:prstGeom prst="rect">
               <a:avLst/>
@@ -4495,25 +4517,16 @@
             <a:p>
               <a:pPr algn="ctr"/>
               <a:r>
-                <a:rPr lang="en-US" sz="630" dirty="0">
-                  <a:latin typeface="Univers 47 Condensed Light" pitchFamily="2" charset="77"/>
-                </a:rPr>
-                <a:t>Reach </a:t>
-              </a:r>
-              <a:r>
                 <a:rPr lang="en-US" sz="700" dirty="0">
                   <a:latin typeface="Univers 47 Condensed Light" pitchFamily="2" charset="77"/>
                 </a:rPr>
-                <a:t>width</a:t>
+                <a:t>Reach width</a:t>
               </a:r>
-              <a:endParaRPr lang="en-US" sz="630" dirty="0">
-                <a:latin typeface="Univers 47 Condensed Light" pitchFamily="2" charset="77"/>
-              </a:endParaRPr>
             </a:p>
             <a:p>
               <a:pPr algn="ctr"/>
               <a:r>
-                <a:rPr lang="en-US" sz="630" dirty="0">
+                <a:rPr lang="en-US" sz="700" dirty="0">
                   <a:latin typeface="Univers 47 Condensed Light" pitchFamily="2" charset="77"/>
                 </a:rPr>
                 <a:t>(RWID)</a:t>
@@ -4537,8 +4550,8 @@
           </p:nvCxnSpPr>
           <p:spPr>
             <a:xfrm>
-              <a:off x="2635459" y="858129"/>
-              <a:ext cx="0" cy="1179800"/>
+              <a:off x="2637616" y="901356"/>
+              <a:ext cx="0" cy="1134416"/>
             </a:xfrm>
             <a:prstGeom prst="straightConnector1">
               <a:avLst/>
@@ -4576,14 +4589,15 @@
               </a:extLst>
             </p:cNvPr>
             <p:cNvCxnSpPr>
+              <a:cxnSpLocks/>
               <a:stCxn id="30" idx="1"/>
             </p:cNvCxnSpPr>
             <p:nvPr/>
           </p:nvCxnSpPr>
           <p:spPr>
             <a:xfrm flipH="1" flipV="1">
-              <a:off x="3564334" y="1718159"/>
-              <a:ext cx="221112" cy="95479"/>
+              <a:off x="3585145" y="1714205"/>
+              <a:ext cx="221113" cy="95479"/>
             </a:xfrm>
             <a:prstGeom prst="line">
               <a:avLst/>
@@ -4663,8 +4677,8 @@
           </p:nvCxnSpPr>
           <p:spPr>
             <a:xfrm>
-              <a:off x="837820" y="612164"/>
-              <a:ext cx="3272898" cy="2451"/>
+              <a:off x="850762" y="612164"/>
+              <a:ext cx="3303546" cy="0"/>
             </a:xfrm>
             <a:prstGeom prst="straightConnector1">
               <a:avLst/>
@@ -4706,8 +4720,8 @@
           </p:nvSpPr>
           <p:spPr>
             <a:xfrm>
-              <a:off x="2097303" y="518855"/>
-              <a:ext cx="952871" cy="200055"/>
+              <a:off x="2265534" y="518855"/>
+              <a:ext cx="768818" cy="200055"/>
             </a:xfrm>
             <a:prstGeom prst="rect">
               <a:avLst/>
@@ -5103,6 +5117,49 @@
             </a:fontRef>
           </p:style>
         </p:cxnSp>
+        <p:cxnSp>
+          <p:nvCxnSpPr>
+            <p:cNvPr id="55" name="Straight Connector 54">
+              <a:extLst>
+                <a:ext uri="{FF2B5EF4-FFF2-40B4-BE49-F238E27FC236}">
+                  <a16:creationId xmlns:a16="http://schemas.microsoft.com/office/drawing/2014/main" id="{59D44541-FC9C-2C45-9696-1427AA9A2815}"/>
+                </a:ext>
+              </a:extLst>
+            </p:cNvPr>
+            <p:cNvCxnSpPr>
+              <a:cxnSpLocks/>
+            </p:cNvCxnSpPr>
+            <p:nvPr/>
+          </p:nvCxnSpPr>
+          <p:spPr>
+            <a:xfrm flipV="1">
+              <a:off x="4158392" y="559771"/>
+              <a:ext cx="0" cy="318277"/>
+            </a:xfrm>
+            <a:prstGeom prst="line">
+              <a:avLst/>
+            </a:prstGeom>
+            <a:ln>
+              <a:solidFill>
+                <a:schemeClr val="tx1"/>
+              </a:solidFill>
+            </a:ln>
+          </p:spPr>
+          <p:style>
+            <a:lnRef idx="1">
+              <a:schemeClr val="accent1"/>
+            </a:lnRef>
+            <a:fillRef idx="0">
+              <a:schemeClr val="accent1"/>
+            </a:fillRef>
+            <a:effectRef idx="0">
+              <a:schemeClr val="accent1"/>
+            </a:effectRef>
+            <a:fontRef idx="minor">
+              <a:schemeClr val="tx1"/>
+            </a:fontRef>
+          </p:style>
+        </p:cxnSp>
         <p:sp>
           <p:nvSpPr>
             <p:cNvPr id="19" name="Oval 18">
@@ -5117,7 +5174,7 @@
           </p:nvSpPr>
           <p:spPr>
             <a:xfrm>
-              <a:off x="4059460" y="729691"/>
+              <a:off x="4172125" y="718910"/>
               <a:ext cx="112665" cy="112665"/>
             </a:xfrm>
             <a:prstGeom prst="ellipse">

</xml_diff>